<commit_message>
Minor ammendmant to instructions design
The continue button is now available to both actors and viewer the only difference is the destination

Refs #54
</commit_message>
<xml_diff>
--- a/Design/UIDesign/instructions.pptx
+++ b/Design/UIDesign/instructions.pptx
@@ -243,7 +243,7 @@
           <a:p>
             <a:fld id="{DC9AFC99-8CBA-4602-827C-86159FB432DE}" type="datetimeFigureOut">
               <a:rPr lang="en-GB" smtClean="0"/>
-              <a:t>22/03/2017</a:t>
+              <a:t>01/04/2017</a:t>
             </a:fld>
             <a:endParaRPr lang="en-GB"/>
           </a:p>
@@ -413,7 +413,7 @@
           <a:p>
             <a:fld id="{DC9AFC99-8CBA-4602-827C-86159FB432DE}" type="datetimeFigureOut">
               <a:rPr lang="en-GB" smtClean="0"/>
-              <a:t>22/03/2017</a:t>
+              <a:t>01/04/2017</a:t>
             </a:fld>
             <a:endParaRPr lang="en-GB"/>
           </a:p>
@@ -593,7 +593,7 @@
           <a:p>
             <a:fld id="{DC9AFC99-8CBA-4602-827C-86159FB432DE}" type="datetimeFigureOut">
               <a:rPr lang="en-GB" smtClean="0"/>
-              <a:t>22/03/2017</a:t>
+              <a:t>01/04/2017</a:t>
             </a:fld>
             <a:endParaRPr lang="en-GB"/>
           </a:p>
@@ -763,7 +763,7 @@
           <a:p>
             <a:fld id="{DC9AFC99-8CBA-4602-827C-86159FB432DE}" type="datetimeFigureOut">
               <a:rPr lang="en-GB" smtClean="0"/>
-              <a:t>22/03/2017</a:t>
+              <a:t>01/04/2017</a:t>
             </a:fld>
             <a:endParaRPr lang="en-GB"/>
           </a:p>
@@ -1009,7 +1009,7 @@
           <a:p>
             <a:fld id="{DC9AFC99-8CBA-4602-827C-86159FB432DE}" type="datetimeFigureOut">
               <a:rPr lang="en-GB" smtClean="0"/>
-              <a:t>22/03/2017</a:t>
+              <a:t>01/04/2017</a:t>
             </a:fld>
             <a:endParaRPr lang="en-GB"/>
           </a:p>
@@ -1241,7 +1241,7 @@
           <a:p>
             <a:fld id="{DC9AFC99-8CBA-4602-827C-86159FB432DE}" type="datetimeFigureOut">
               <a:rPr lang="en-GB" smtClean="0"/>
-              <a:t>22/03/2017</a:t>
+              <a:t>01/04/2017</a:t>
             </a:fld>
             <a:endParaRPr lang="en-GB"/>
           </a:p>
@@ -1608,7 +1608,7 @@
           <a:p>
             <a:fld id="{DC9AFC99-8CBA-4602-827C-86159FB432DE}" type="datetimeFigureOut">
               <a:rPr lang="en-GB" smtClean="0"/>
-              <a:t>22/03/2017</a:t>
+              <a:t>01/04/2017</a:t>
             </a:fld>
             <a:endParaRPr lang="en-GB"/>
           </a:p>
@@ -1726,7 +1726,7 @@
           <a:p>
             <a:fld id="{DC9AFC99-8CBA-4602-827C-86159FB432DE}" type="datetimeFigureOut">
               <a:rPr lang="en-GB" smtClean="0"/>
-              <a:t>22/03/2017</a:t>
+              <a:t>01/04/2017</a:t>
             </a:fld>
             <a:endParaRPr lang="en-GB"/>
           </a:p>
@@ -1821,7 +1821,7 @@
           <a:p>
             <a:fld id="{DC9AFC99-8CBA-4602-827C-86159FB432DE}" type="datetimeFigureOut">
               <a:rPr lang="en-GB" smtClean="0"/>
-              <a:t>22/03/2017</a:t>
+              <a:t>01/04/2017</a:t>
             </a:fld>
             <a:endParaRPr lang="en-GB"/>
           </a:p>
@@ -2098,7 +2098,7 @@
           <a:p>
             <a:fld id="{DC9AFC99-8CBA-4602-827C-86159FB432DE}" type="datetimeFigureOut">
               <a:rPr lang="en-GB" smtClean="0"/>
-              <a:t>22/03/2017</a:t>
+              <a:t>01/04/2017</a:t>
             </a:fld>
             <a:endParaRPr lang="en-GB"/>
           </a:p>
@@ -2351,7 +2351,7 @@
           <a:p>
             <a:fld id="{DC9AFC99-8CBA-4602-827C-86159FB432DE}" type="datetimeFigureOut">
               <a:rPr lang="en-GB" smtClean="0"/>
-              <a:t>22/03/2017</a:t>
+              <a:t>01/04/2017</a:t>
             </a:fld>
             <a:endParaRPr lang="en-GB"/>
           </a:p>
@@ -2564,7 +2564,7 @@
           <a:p>
             <a:fld id="{DC9AFC99-8CBA-4602-827C-86159FB432DE}" type="datetimeFigureOut">
               <a:rPr lang="en-GB" smtClean="0"/>
-              <a:t>22/03/2017</a:t>
+              <a:t>01/04/2017</a:t>
             </a:fld>
             <a:endParaRPr lang="en-GB"/>
           </a:p>
@@ -3141,14 +3141,22 @@
             <a:pPr algn="ctr"/>
             <a:r>
               <a:rPr lang="en-GB" dirty="0"/>
-              <a:t>Continue to phrase selection</a:t>
+              <a:t>Continue</a:t>
             </a:r>
           </a:p>
           <a:p>
             <a:pPr algn="ctr"/>
             <a:r>
-              <a:rPr lang="en-GB" sz="1400" i="1" dirty="0"/>
-              <a:t>(This button is replace by a please wait message if these are the user instructions)</a:t>
+              <a:rPr lang="en-GB" sz="1200" i="1" dirty="0"/>
+              <a:t>(actor -&gt; /phrase selection/ , viewer -&gt; /{{</a:t>
+            </a:r>
+            <a:r>
+              <a:rPr lang="en-GB" sz="1200" i="1" dirty="0" err="1"/>
+              <a:t>viewer_num</a:t>
+            </a:r>
+            <a:r>
+              <a:rPr lang="en-GB" sz="1200" i="1" dirty="0"/>
+              <a:t>}}/guess/)</a:t>
             </a:r>
           </a:p>
         </p:txBody>

</xml_diff>